<commit_message>
adding new ppt, plus updating, popular_paths.csv
</commit_message>
<xml_diff>
--- a/deliverables/6-presentation.pptx
+++ b/deliverables/6-presentation.pptx
@@ -132,6 +132,10 @@
 </p:presentation>
 </file>
 
+<file path=ppt/revisionInfo.xml><?xml version="1.0" encoding="utf-8"?>
+<p1510:revInfo xmlns:a="http://schemas.openxmlformats.org/drawingml/2006/main" xmlns:r="http://schemas.openxmlformats.org/officeDocument/2006/relationships" xmlns:p1510="http://schemas.microsoft.com/office/powerpoint/2015/10/main"/>
+</file>
+
 <file path=ppt/slideLayouts/slideLayout1.xml><?xml version="1.0" encoding="utf-8"?>
 <p:sldLayout xmlns:a="http://schemas.openxmlformats.org/drawingml/2006/main" xmlns:r="http://schemas.openxmlformats.org/officeDocument/2006/relationships" xmlns:p="http://schemas.openxmlformats.org/presentationml/2006/main" type="title" preserve="1">
   <p:cSld name="Title Slide">
@@ -227,7 +231,7 @@
           <a:effectLst/>
           <a:extLst>
             <a:ext uri="{91240B29-F687-4f45-9708-019B960494DF}">
-              <a14:hiddenLine xmlns="" xmlns:a14="http://schemas.microsoft.com/office/drawing/2010/main" w="9525">
+              <a14:hiddenLine xmlns:a14="http://schemas.microsoft.com/office/drawing/2010/main" xmlns="" w="9525">
                 <a:solidFill>
                   <a:srgbClr val="000000"/>
                 </a:solidFill>
@@ -278,7 +282,7 @@
           </a:lstStyle>
           <a:p>
             <a:r>
-              <a:rPr lang="en-US" smtClean="0"/>
+              <a:rPr lang="en-US"/>
               <a:t>Click to edit Master title style</a:t>
             </a:r>
             <a:endParaRPr lang="en-US" dirty="0"/>
@@ -395,7 +399,7 @@
           </a:lstStyle>
           <a:p>
             <a:r>
-              <a:rPr lang="en-US" smtClean="0"/>
+              <a:rPr lang="en-US"/>
               <a:t>Click to edit Master subtitle style</a:t>
             </a:r>
             <a:endParaRPr lang="en-US" dirty="0"/>
@@ -420,7 +424,7 @@
             <a:fld id="{08B9EBBA-996F-894A-B54A-D6246ED52CEA}" type="datetimeFigureOut">
               <a:rPr lang="en-US" dirty="0"/>
               <a:pPr/>
-              <a:t>12/4/17</a:t>
+              <a:t>12/4/2017</a:t>
             </a:fld>
             <a:endParaRPr lang="en-US" dirty="0"/>
           </a:p>
@@ -521,7 +525,7 @@
           </a:lstStyle>
           <a:p>
             <a:r>
-              <a:rPr lang="en-US" smtClean="0"/>
+              <a:rPr lang="en-US"/>
               <a:t>Click to edit Master title style</a:t>
             </a:r>
             <a:endParaRPr lang="en-US" dirty="0"/>
@@ -643,7 +647,7 @@
           </a:lstStyle>
           <a:p>
             <a:r>
-              <a:rPr lang="en-US" smtClean="0"/>
+              <a:rPr lang="en-US"/>
               <a:t>Drag picture to placeholder or click icon to add</a:t>
             </a:r>
             <a:endParaRPr lang="en-US" dirty="0"/>
@@ -711,7 +715,7 @@
           <a:p>
             <a:pPr lvl="0"/>
             <a:r>
-              <a:rPr lang="en-US" smtClean="0"/>
+              <a:rPr lang="en-US"/>
               <a:t>Click to edit Master text styles</a:t>
             </a:r>
           </a:p>
@@ -735,7 +739,7 @@
             <a:fld id="{18C79C5D-2A6F-F04D-97DA-BEF2467B64E4}" type="datetimeFigureOut">
               <a:rPr lang="en-US" dirty="0"/>
               <a:pPr/>
-              <a:t>12/4/17</a:t>
+              <a:t>12/4/2017</a:t>
             </a:fld>
             <a:endParaRPr lang="en-US" dirty="0"/>
           </a:p>
@@ -1042,7 +1046,7 @@
           </a:lstStyle>
           <a:p>
             <a:r>
-              <a:rPr lang="en-US" smtClean="0"/>
+              <a:rPr lang="en-US"/>
               <a:t>Click to edit Master title style</a:t>
             </a:r>
             <a:endParaRPr lang="en-US" dirty="0"/>
@@ -1162,7 +1166,7 @@
           <a:p>
             <a:pPr lvl="0"/>
             <a:r>
-              <a:rPr lang="en-US" smtClean="0"/>
+              <a:rPr lang="en-US"/>
               <a:t>Click to edit Master text styles</a:t>
             </a:r>
           </a:p>
@@ -1196,7 +1200,7 @@
           <a:p>
             <a:pPr lvl="0"/>
             <a:r>
-              <a:rPr lang="en-US" smtClean="0"/>
+              <a:rPr lang="en-US"/>
               <a:t>Click to edit Master text styles</a:t>
             </a:r>
           </a:p>
@@ -1220,7 +1224,7 @@
             <a:fld id="{8DFA1846-DA80-1C48-A609-854EA85C59AD}" type="datetimeFigureOut">
               <a:rPr lang="en-US" dirty="0"/>
               <a:pPr/>
-              <a:t>12/4/17</a:t>
+              <a:t>12/4/2017</a:t>
             </a:fld>
             <a:endParaRPr lang="en-US" dirty="0"/>
           </a:p>
@@ -1527,7 +1531,7 @@
           </a:lstStyle>
           <a:p>
             <a:r>
-              <a:rPr lang="en-US" smtClean="0"/>
+              <a:rPr lang="en-US"/>
               <a:t>Click to edit Master title style</a:t>
             </a:r>
             <a:endParaRPr lang="en-US" dirty="0"/>
@@ -1562,7 +1566,7 @@
           <a:p>
             <a:pPr lvl="0"/>
             <a:r>
-              <a:rPr lang="en-US" smtClean="0"/>
+              <a:rPr lang="en-US"/>
               <a:t>Click to edit Master text styles</a:t>
             </a:r>
           </a:p>
@@ -1586,7 +1590,7 @@
             <a:fld id="{FBF54567-0DE4-3F47-BF90-CB84690072F9}" type="datetimeFigureOut">
               <a:rPr lang="en-US" dirty="0"/>
               <a:pPr/>
-              <a:t>12/4/17</a:t>
+              <a:t>12/4/2017</a:t>
             </a:fld>
             <a:endParaRPr lang="en-US" dirty="0"/>
           </a:p>
@@ -1737,7 +1741,7 @@
           <a:ln/>
           <a:extLst>
             <a:ext uri="{91240B29-F687-4f45-9708-019B960494DF}">
-              <a14:hiddenLine xmlns="" xmlns:a14="http://schemas.microsoft.com/office/drawing/2010/main" w="9525">
+              <a14:hiddenLine xmlns:a14="http://schemas.microsoft.com/office/drawing/2010/main" xmlns="" w="9525">
                 <a:solidFill>
                   <a:srgbClr val="000000"/>
                 </a:solidFill>
@@ -1779,7 +1783,7 @@
           <a:lstStyle/>
           <a:p>
             <a:r>
-              <a:rPr lang="en-US" smtClean="0"/>
+              <a:rPr lang="en-US"/>
               <a:t>Click to edit Master title style</a:t>
             </a:r>
             <a:endParaRPr lang="en-US" dirty="0"/>
@@ -1803,35 +1807,35 @@
           <a:p>
             <a:pPr lvl="0"/>
             <a:r>
-              <a:rPr lang="en-US" smtClean="0"/>
+              <a:rPr lang="en-US"/>
               <a:t>Click to edit Master text styles</a:t>
             </a:r>
           </a:p>
           <a:p>
             <a:pPr lvl="1"/>
             <a:r>
-              <a:rPr lang="en-US" smtClean="0"/>
+              <a:rPr lang="en-US"/>
               <a:t>Second level</a:t>
             </a:r>
           </a:p>
           <a:p>
             <a:pPr lvl="2"/>
             <a:r>
-              <a:rPr lang="en-US" smtClean="0"/>
+              <a:rPr lang="en-US"/>
               <a:t>Third level</a:t>
             </a:r>
           </a:p>
           <a:p>
             <a:pPr lvl="3"/>
             <a:r>
-              <a:rPr lang="en-US" smtClean="0"/>
+              <a:rPr lang="en-US"/>
               <a:t>Fourth level</a:t>
             </a:r>
           </a:p>
           <a:p>
             <a:pPr lvl="4"/>
             <a:r>
-              <a:rPr lang="en-US" smtClean="0"/>
+              <a:rPr lang="en-US"/>
               <a:t>Fifth level</a:t>
             </a:r>
             <a:endParaRPr lang="en-US" dirty="0"/>
@@ -1856,7 +1860,7 @@
             <a:fld id="{C6C52C72-DE31-F449-A4ED-4C594FD91407}" type="datetimeFigureOut">
               <a:rPr lang="en-US" dirty="0"/>
               <a:pPr/>
-              <a:t>12/4/17</a:t>
+              <a:t>12/4/2017</a:t>
             </a:fld>
             <a:endParaRPr lang="en-US" dirty="0"/>
           </a:p>
@@ -2009,7 +2013,7 @@
           <a:ln/>
           <a:extLst>
             <a:ext uri="{91240B29-F687-4f45-9708-019B960494DF}">
-              <a14:hiddenLine xmlns="" xmlns:a14="http://schemas.microsoft.com/office/drawing/2010/main" w="9525">
+              <a14:hiddenLine xmlns:a14="http://schemas.microsoft.com/office/drawing/2010/main" xmlns="" w="9525">
                 <a:solidFill>
                   <a:srgbClr val="000000"/>
                 </a:solidFill>
@@ -2056,7 +2060,7 @@
           <a:lstStyle/>
           <a:p>
             <a:r>
-              <a:rPr lang="en-US" smtClean="0"/>
+              <a:rPr lang="en-US"/>
               <a:t>Click to edit Master title style</a:t>
             </a:r>
             <a:endParaRPr lang="en-US" dirty="0"/>
@@ -2085,35 +2089,35 @@
           <a:p>
             <a:pPr lvl="0"/>
             <a:r>
-              <a:rPr lang="en-US" smtClean="0"/>
+              <a:rPr lang="en-US"/>
               <a:t>Click to edit Master text styles</a:t>
             </a:r>
           </a:p>
           <a:p>
             <a:pPr lvl="1"/>
             <a:r>
-              <a:rPr lang="en-US" smtClean="0"/>
+              <a:rPr lang="en-US"/>
               <a:t>Second level</a:t>
             </a:r>
           </a:p>
           <a:p>
             <a:pPr lvl="2"/>
             <a:r>
-              <a:rPr lang="en-US" smtClean="0"/>
+              <a:rPr lang="en-US"/>
               <a:t>Third level</a:t>
             </a:r>
           </a:p>
           <a:p>
             <a:pPr lvl="3"/>
             <a:r>
-              <a:rPr lang="en-US" smtClean="0"/>
+              <a:rPr lang="en-US"/>
               <a:t>Fourth level</a:t>
             </a:r>
           </a:p>
           <a:p>
             <a:pPr lvl="4"/>
             <a:r>
-              <a:rPr lang="en-US" smtClean="0"/>
+              <a:rPr lang="en-US"/>
               <a:t>Fifth level</a:t>
             </a:r>
             <a:endParaRPr lang="en-US" dirty="0"/>
@@ -2138,7 +2142,7 @@
             <a:fld id="{ED62726E-379B-B349-9EED-81ED093FA806}" type="datetimeFigureOut">
               <a:rPr lang="en-US" dirty="0"/>
               <a:pPr/>
-              <a:t>12/4/17</a:t>
+              <a:t>12/4/2017</a:t>
             </a:fld>
             <a:endParaRPr lang="en-US" dirty="0"/>
           </a:p>
@@ -2289,7 +2293,7 @@
           <a:ln/>
           <a:extLst>
             <a:ext uri="{91240B29-F687-4f45-9708-019B960494DF}">
-              <a14:hiddenLine xmlns="" xmlns:a14="http://schemas.microsoft.com/office/drawing/2010/main" w="9525">
+              <a14:hiddenLine xmlns:a14="http://schemas.microsoft.com/office/drawing/2010/main" xmlns="" w="9525">
                 <a:solidFill>
                   <a:srgbClr val="000000"/>
                 </a:solidFill>
@@ -2336,7 +2340,7 @@
           <a:lstStyle/>
           <a:p>
             <a:r>
-              <a:rPr lang="en-US" smtClean="0"/>
+              <a:rPr lang="en-US"/>
               <a:t>Click to edit Master title style</a:t>
             </a:r>
             <a:endParaRPr lang="en-US" dirty="0"/>
@@ -2365,35 +2369,35 @@
           <a:p>
             <a:pPr lvl="0"/>
             <a:r>
-              <a:rPr lang="en-US" smtClean="0"/>
+              <a:rPr lang="en-US"/>
               <a:t>Click to edit Master text styles</a:t>
             </a:r>
           </a:p>
           <a:p>
             <a:pPr lvl="1"/>
             <a:r>
-              <a:rPr lang="en-US" smtClean="0"/>
+              <a:rPr lang="en-US"/>
               <a:t>Second level</a:t>
             </a:r>
           </a:p>
           <a:p>
             <a:pPr lvl="2"/>
             <a:r>
-              <a:rPr lang="en-US" smtClean="0"/>
+              <a:rPr lang="en-US"/>
               <a:t>Third level</a:t>
             </a:r>
           </a:p>
           <a:p>
             <a:pPr lvl="3"/>
             <a:r>
-              <a:rPr lang="en-US" smtClean="0"/>
+              <a:rPr lang="en-US"/>
               <a:t>Fourth level</a:t>
             </a:r>
           </a:p>
           <a:p>
             <a:pPr lvl="4"/>
             <a:r>
-              <a:rPr lang="en-US" smtClean="0"/>
+              <a:rPr lang="en-US"/>
               <a:t>Fifth level</a:t>
             </a:r>
             <a:endParaRPr lang="en-US" dirty="0"/>
@@ -2418,7 +2422,7 @@
             <a:fld id="{9B3A1323-8D79-1946-B0D7-40001CF92E9D}" type="datetimeFigureOut">
               <a:rPr lang="en-US" dirty="0"/>
               <a:pPr/>
-              <a:t>12/4/17</a:t>
+              <a:t>12/4/2017</a:t>
             </a:fld>
             <a:endParaRPr lang="en-US" dirty="0"/>
           </a:p>
@@ -2614,7 +2618,7 @@
           </a:lstStyle>
           <a:p>
             <a:r>
-              <a:rPr lang="en-US" smtClean="0"/>
+              <a:rPr lang="en-US"/>
               <a:t>Click to edit Master title style</a:t>
             </a:r>
             <a:endParaRPr lang="en-US" dirty="0"/>
@@ -2734,7 +2738,7 @@
           <a:p>
             <a:pPr lvl="0"/>
             <a:r>
-              <a:rPr lang="en-US" smtClean="0"/>
+              <a:rPr lang="en-US"/>
               <a:t>Click to edit Master text styles</a:t>
             </a:r>
           </a:p>
@@ -2758,7 +2762,7 @@
             <a:fld id="{8DFA1846-DA80-1C48-A609-854EA85C59AD}" type="datetimeFigureOut">
               <a:rPr lang="en-US" dirty="0"/>
               <a:pPr/>
-              <a:t>12/4/17</a:t>
+              <a:t>12/4/2017</a:t>
             </a:fld>
             <a:endParaRPr lang="en-US" dirty="0"/>
           </a:p>
@@ -2909,7 +2913,7 @@
           <a:ln/>
           <a:extLst>
             <a:ext uri="{91240B29-F687-4f45-9708-019B960494DF}">
-              <a14:hiddenLine xmlns="" xmlns:a14="http://schemas.microsoft.com/office/drawing/2010/main" w="9525">
+              <a14:hiddenLine xmlns:a14="http://schemas.microsoft.com/office/drawing/2010/main" xmlns="" w="9525">
                 <a:solidFill>
                   <a:srgbClr val="000000"/>
                 </a:solidFill>
@@ -2951,7 +2955,7 @@
           <a:lstStyle/>
           <a:p>
             <a:r>
-              <a:rPr lang="en-US" smtClean="0"/>
+              <a:rPr lang="en-US"/>
               <a:t>Click to edit Master title style</a:t>
             </a:r>
             <a:endParaRPr lang="en-US" dirty="0"/>
@@ -2982,35 +2986,35 @@
           <a:p>
             <a:pPr lvl="0"/>
             <a:r>
-              <a:rPr lang="en-US" smtClean="0"/>
+              <a:rPr lang="en-US"/>
               <a:t>Click to edit Master text styles</a:t>
             </a:r>
           </a:p>
           <a:p>
             <a:pPr lvl="1"/>
             <a:r>
-              <a:rPr lang="en-US" smtClean="0"/>
+              <a:rPr lang="en-US"/>
               <a:t>Second level</a:t>
             </a:r>
           </a:p>
           <a:p>
             <a:pPr lvl="2"/>
             <a:r>
-              <a:rPr lang="en-US" smtClean="0"/>
+              <a:rPr lang="en-US"/>
               <a:t>Third level</a:t>
             </a:r>
           </a:p>
           <a:p>
             <a:pPr lvl="3"/>
             <a:r>
-              <a:rPr lang="en-US" smtClean="0"/>
+              <a:rPr lang="en-US"/>
               <a:t>Fourth level</a:t>
             </a:r>
           </a:p>
           <a:p>
             <a:pPr lvl="4"/>
             <a:r>
-              <a:rPr lang="en-US" smtClean="0"/>
+              <a:rPr lang="en-US"/>
               <a:t>Fifth level</a:t>
             </a:r>
             <a:endParaRPr lang="en-US" dirty="0"/>
@@ -3041,35 +3045,35 @@
           <a:p>
             <a:pPr lvl="0"/>
             <a:r>
-              <a:rPr lang="en-US" smtClean="0"/>
+              <a:rPr lang="en-US"/>
               <a:t>Click to edit Master text styles</a:t>
             </a:r>
           </a:p>
           <a:p>
             <a:pPr lvl="1"/>
             <a:r>
-              <a:rPr lang="en-US" smtClean="0"/>
+              <a:rPr lang="en-US"/>
               <a:t>Second level</a:t>
             </a:r>
           </a:p>
           <a:p>
             <a:pPr lvl="2"/>
             <a:r>
-              <a:rPr lang="en-US" smtClean="0"/>
+              <a:rPr lang="en-US"/>
               <a:t>Third level</a:t>
             </a:r>
           </a:p>
           <a:p>
             <a:pPr lvl="3"/>
             <a:r>
-              <a:rPr lang="en-US" smtClean="0"/>
+              <a:rPr lang="en-US"/>
               <a:t>Fourth level</a:t>
             </a:r>
           </a:p>
           <a:p>
             <a:pPr lvl="4"/>
             <a:r>
-              <a:rPr lang="en-US" smtClean="0"/>
+              <a:rPr lang="en-US"/>
               <a:t>Fifth level</a:t>
             </a:r>
             <a:endParaRPr lang="en-US" dirty="0"/>
@@ -3094,7 +3098,7 @@
             <a:fld id="{57302355-E14B-8545-A8F8-0FE83CC9D524}" type="datetimeFigureOut">
               <a:rPr lang="en-US" dirty="0"/>
               <a:pPr/>
-              <a:t>12/4/17</a:t>
+              <a:t>12/4/2017</a:t>
             </a:fld>
             <a:endParaRPr lang="en-US" dirty="0"/>
           </a:p>
@@ -3245,7 +3249,7 @@
           <a:ln/>
           <a:extLst>
             <a:ext uri="{91240B29-F687-4f45-9708-019B960494DF}">
-              <a14:hiddenLine xmlns="" xmlns:a14="http://schemas.microsoft.com/office/drawing/2010/main" w="9525">
+              <a14:hiddenLine xmlns:a14="http://schemas.microsoft.com/office/drawing/2010/main" xmlns="" w="9525">
                 <a:solidFill>
                   <a:srgbClr val="000000"/>
                 </a:solidFill>
@@ -3291,7 +3295,7 @@
           </a:lstStyle>
           <a:p>
             <a:r>
-              <a:rPr lang="en-US" smtClean="0"/>
+              <a:rPr lang="en-US"/>
               <a:t>Click to edit Master title style</a:t>
             </a:r>
             <a:endParaRPr lang="en-US" dirty="0"/>
@@ -3359,7 +3363,7 @@
           <a:p>
             <a:pPr lvl="0"/>
             <a:r>
-              <a:rPr lang="en-US" smtClean="0"/>
+              <a:rPr lang="en-US"/>
               <a:t>Click to edit Master text styles</a:t>
             </a:r>
           </a:p>
@@ -3389,35 +3393,35 @@
           <a:p>
             <a:pPr lvl="0"/>
             <a:r>
-              <a:rPr lang="en-US" smtClean="0"/>
+              <a:rPr lang="en-US"/>
               <a:t>Click to edit Master text styles</a:t>
             </a:r>
           </a:p>
           <a:p>
             <a:pPr lvl="1"/>
             <a:r>
-              <a:rPr lang="en-US" smtClean="0"/>
+              <a:rPr lang="en-US"/>
               <a:t>Second level</a:t>
             </a:r>
           </a:p>
           <a:p>
             <a:pPr lvl="2"/>
             <a:r>
-              <a:rPr lang="en-US" smtClean="0"/>
+              <a:rPr lang="en-US"/>
               <a:t>Third level</a:t>
             </a:r>
           </a:p>
           <a:p>
             <a:pPr lvl="3"/>
             <a:r>
-              <a:rPr lang="en-US" smtClean="0"/>
+              <a:rPr lang="en-US"/>
               <a:t>Fourth level</a:t>
             </a:r>
           </a:p>
           <a:p>
             <a:pPr lvl="4"/>
             <a:r>
-              <a:rPr lang="en-US" smtClean="0"/>
+              <a:rPr lang="en-US"/>
               <a:t>Fifth level</a:t>
             </a:r>
             <a:endParaRPr lang="en-US" dirty="0"/>
@@ -3485,7 +3489,7 @@
           <a:p>
             <a:pPr lvl="0"/>
             <a:r>
-              <a:rPr lang="en-US" smtClean="0"/>
+              <a:rPr lang="en-US"/>
               <a:t>Click to edit Master text styles</a:t>
             </a:r>
           </a:p>
@@ -3515,35 +3519,35 @@
           <a:p>
             <a:pPr lvl="0"/>
             <a:r>
-              <a:rPr lang="en-US" smtClean="0"/>
+              <a:rPr lang="en-US"/>
               <a:t>Click to edit Master text styles</a:t>
             </a:r>
           </a:p>
           <a:p>
             <a:pPr lvl="1"/>
             <a:r>
-              <a:rPr lang="en-US" smtClean="0"/>
+              <a:rPr lang="en-US"/>
               <a:t>Second level</a:t>
             </a:r>
           </a:p>
           <a:p>
             <a:pPr lvl="2"/>
             <a:r>
-              <a:rPr lang="en-US" smtClean="0"/>
+              <a:rPr lang="en-US"/>
               <a:t>Third level</a:t>
             </a:r>
           </a:p>
           <a:p>
             <a:pPr lvl="3"/>
             <a:r>
-              <a:rPr lang="en-US" smtClean="0"/>
+              <a:rPr lang="en-US"/>
               <a:t>Fourth level</a:t>
             </a:r>
           </a:p>
           <a:p>
             <a:pPr lvl="4"/>
             <a:r>
-              <a:rPr lang="en-US" smtClean="0"/>
+              <a:rPr lang="en-US"/>
               <a:t>Fifth level</a:t>
             </a:r>
             <a:endParaRPr lang="en-US" dirty="0"/>
@@ -3568,7 +3572,7 @@
             <a:fld id="{02640F58-564D-2B4F-AE67-E407BA4FCF45}" type="datetimeFigureOut">
               <a:rPr lang="en-US" dirty="0"/>
               <a:pPr/>
-              <a:t>12/4/17</a:t>
+              <a:t>12/4/2017</a:t>
             </a:fld>
             <a:endParaRPr lang="en-US" dirty="0"/>
           </a:p>
@@ -3719,7 +3723,7 @@
           <a:ln/>
           <a:extLst>
             <a:ext uri="{91240B29-F687-4f45-9708-019B960494DF}">
-              <a14:hiddenLine xmlns="" xmlns:a14="http://schemas.microsoft.com/office/drawing/2010/main" w="9525">
+              <a14:hiddenLine xmlns:a14="http://schemas.microsoft.com/office/drawing/2010/main" xmlns="" w="9525">
                 <a:solidFill>
                   <a:srgbClr val="000000"/>
                 </a:solidFill>
@@ -3761,7 +3765,7 @@
           <a:lstStyle/>
           <a:p>
             <a:r>
-              <a:rPr lang="en-US" smtClean="0"/>
+              <a:rPr lang="en-US"/>
               <a:t>Click to edit Master title style</a:t>
             </a:r>
             <a:endParaRPr lang="en-US" dirty="0"/>
@@ -3786,7 +3790,7 @@
             <a:fld id="{F13A34C8-038E-2045-AF43-DF7DBB8E0E9E}" type="datetimeFigureOut">
               <a:rPr lang="en-US" dirty="0"/>
               <a:pPr/>
-              <a:t>12/4/17</a:t>
+              <a:t>12/4/2017</a:t>
             </a:fld>
             <a:endParaRPr lang="en-US" dirty="0"/>
           </a:p>
@@ -3878,7 +3882,7 @@
             <a:fld id="{8818C68F-D26B-8F47-958C-23B49CF8A634}" type="datetimeFigureOut">
               <a:rPr lang="en-US" dirty="0"/>
               <a:pPr/>
-              <a:t>12/4/17</a:t>
+              <a:t>12/4/2017</a:t>
             </a:fld>
             <a:endParaRPr lang="en-US" dirty="0"/>
           </a:p>
@@ -4142,7 +4146,7 @@
           <a:ln/>
           <a:extLst>
             <a:ext uri="{91240B29-F687-4f45-9708-019B960494DF}">
-              <a14:hiddenLine xmlns="" xmlns:a14="http://schemas.microsoft.com/office/drawing/2010/main" w="9525">
+              <a14:hiddenLine xmlns:a14="http://schemas.microsoft.com/office/drawing/2010/main" xmlns="" w="9525">
                 <a:solidFill>
                   <a:srgbClr val="000000"/>
                 </a:solidFill>
@@ -4193,7 +4197,7 @@
           </a:lstStyle>
           <a:p>
             <a:r>
-              <a:rPr lang="en-US" smtClean="0"/>
+              <a:rPr lang="en-US"/>
               <a:t>Click to edit Master title style</a:t>
             </a:r>
             <a:endParaRPr lang="en-US" dirty="0"/>
@@ -4224,35 +4228,35 @@
           <a:p>
             <a:pPr lvl="0"/>
             <a:r>
-              <a:rPr lang="en-US" smtClean="0"/>
+              <a:rPr lang="en-US"/>
               <a:t>Click to edit Master text styles</a:t>
             </a:r>
           </a:p>
           <a:p>
             <a:pPr lvl="1"/>
             <a:r>
-              <a:rPr lang="en-US" smtClean="0"/>
+              <a:rPr lang="en-US"/>
               <a:t>Second level</a:t>
             </a:r>
           </a:p>
           <a:p>
             <a:pPr lvl="2"/>
             <a:r>
-              <a:rPr lang="en-US" smtClean="0"/>
+              <a:rPr lang="en-US"/>
               <a:t>Third level</a:t>
             </a:r>
           </a:p>
           <a:p>
             <a:pPr lvl="3"/>
             <a:r>
-              <a:rPr lang="en-US" smtClean="0"/>
+              <a:rPr lang="en-US"/>
               <a:t>Fourth level</a:t>
             </a:r>
           </a:p>
           <a:p>
             <a:pPr lvl="4"/>
             <a:r>
-              <a:rPr lang="en-US" smtClean="0"/>
+              <a:rPr lang="en-US"/>
               <a:t>Fifth level</a:t>
             </a:r>
             <a:endParaRPr lang="en-US" dirty="0"/>
@@ -4318,7 +4322,7 @@
           <a:p>
             <a:pPr lvl="0"/>
             <a:r>
-              <a:rPr lang="en-US" smtClean="0"/>
+              <a:rPr lang="en-US"/>
               <a:t>Click to edit Master text styles</a:t>
             </a:r>
           </a:p>
@@ -4342,7 +4346,7 @@
             <a:fld id="{D0DF5E60-9974-AC48-9591-99C2BB44B7CF}" type="datetimeFigureOut">
               <a:rPr lang="en-US" dirty="0"/>
               <a:pPr/>
-              <a:t>12/4/17</a:t>
+              <a:t>12/4/2017</a:t>
             </a:fld>
             <a:endParaRPr lang="en-US" dirty="0"/>
           </a:p>
@@ -4443,7 +4447,7 @@
           </a:lstStyle>
           <a:p>
             <a:r>
-              <a:rPr lang="en-US" smtClean="0"/>
+              <a:rPr lang="en-US"/>
               <a:t>Click to edit Master title style</a:t>
             </a:r>
             <a:endParaRPr lang="en-US" dirty="0"/>
@@ -4555,7 +4559,7 @@
           </a:lstStyle>
           <a:p>
             <a:r>
-              <a:rPr lang="en-US" smtClean="0"/>
+              <a:rPr lang="en-US"/>
               <a:t>Drag picture to placeholder or click icon to add</a:t>
             </a:r>
             <a:endParaRPr lang="en-US" dirty="0"/>
@@ -4623,7 +4627,7 @@
           <a:p>
             <a:pPr lvl="0"/>
             <a:r>
-              <a:rPr lang="en-US" smtClean="0"/>
+              <a:rPr lang="en-US"/>
               <a:t>Click to edit Master text styles</a:t>
             </a:r>
           </a:p>
@@ -4652,7 +4656,7 @@
             <a:fld id="{18C79C5D-2A6F-F04D-97DA-BEF2467B64E4}" type="datetimeFigureOut">
               <a:rPr lang="en-US" dirty="0"/>
               <a:pPr/>
-              <a:t>12/4/17</a:t>
+              <a:t>12/4/2017</a:t>
             </a:fld>
             <a:endParaRPr lang="en-US" dirty="0"/>
           </a:p>
@@ -4774,7 +4778,7 @@
           <a:lstStyle/>
           <a:p>
             <a:r>
-              <a:rPr lang="en-US" smtClean="0"/>
+              <a:rPr lang="en-US"/>
               <a:t>Click to edit Master title style</a:t>
             </a:r>
             <a:endParaRPr lang="en-US" dirty="0"/>
@@ -4815,35 +4819,35 @@
           <a:p>
             <a:pPr lvl="0"/>
             <a:r>
-              <a:rPr lang="en-US" smtClean="0"/>
+              <a:rPr lang="en-US"/>
               <a:t>Click to edit Master text styles</a:t>
             </a:r>
           </a:p>
           <a:p>
             <a:pPr lvl="1"/>
             <a:r>
-              <a:rPr lang="en-US" smtClean="0"/>
+              <a:rPr lang="en-US"/>
               <a:t>Second level</a:t>
             </a:r>
           </a:p>
           <a:p>
             <a:pPr lvl="2"/>
             <a:r>
-              <a:rPr lang="en-US" smtClean="0"/>
+              <a:rPr lang="en-US"/>
               <a:t>Third level</a:t>
             </a:r>
           </a:p>
           <a:p>
             <a:pPr lvl="3"/>
             <a:r>
-              <a:rPr lang="en-US" smtClean="0"/>
+              <a:rPr lang="en-US"/>
               <a:t>Fourth level</a:t>
             </a:r>
           </a:p>
           <a:p>
             <a:pPr lvl="4"/>
             <a:r>
-              <a:rPr lang="en-US" smtClean="0"/>
+              <a:rPr lang="en-US"/>
               <a:t>Fifth level</a:t>
             </a:r>
             <a:endParaRPr lang="en-US" dirty="0"/>
@@ -4919,7 +4923,7 @@
             <a:fld id="{09B482E8-6E0E-1B4F-B1FD-C69DB9E858D9}" type="datetimeFigureOut">
               <a:rPr lang="en-US" dirty="0"/>
               <a:pPr/>
-              <a:t>12/4/17</a:t>
+              <a:t>12/4/2017</a:t>
             </a:fld>
             <a:endParaRPr lang="en-US" dirty="0"/>
           </a:p>
@@ -5387,11 +5391,11 @@
           <a:p>
             <a:pPr algn="ctr"/>
             <a:r>
-              <a:rPr lang="en-US" dirty="0" smtClean="0"/>
+              <a:rPr lang="en-US" dirty="0"/>
               <a:t>Capital Bikeshare </a:t>
             </a:r>
             <a:r>
-              <a:rPr lang="en-US" smtClean="0"/>
+              <a:rPr lang="en-US"/>
               <a:t>data analysis</a:t>
             </a:r>
             <a:endParaRPr lang="en-US" dirty="0"/>
@@ -5414,14 +5418,9 @@
           <a:lstStyle/>
           <a:p>
             <a:r>
-              <a:rPr lang="en-US" dirty="0" smtClean="0"/>
-              <a:t>- GARS </a:t>
-            </a:r>
-            <a:r>
               <a:rPr lang="en-US" dirty="0"/>
-              <a:t>CONSULTING RESOURCES</a:t>
-            </a:r>
-            <a:endParaRPr lang="en-US" dirty="0"/>
+              <a:t>- GARS CONSULTING RESOURCES</a:t>
+            </a:r>
           </a:p>
         </p:txBody>
       </p:sp>
@@ -5435,13 +5434,6 @@
   <p:clrMapOvr>
     <a:masterClrMapping/>
   </p:clrMapOvr>
-  <p:timing>
-    <p:tnLst>
-      <p:par>
-        <p:cTn id="1" dur="indefinite" restart="never" nodeType="tmRoot"/>
-      </p:par>
-    </p:tnLst>
-  </p:timing>
 </p:sld>
 </file>
 
@@ -5479,10 +5471,9 @@
           <a:p>
             <a:pPr algn="ctr"/>
             <a:r>
-              <a:rPr lang="en-US" sz="3600" dirty="0" smtClean="0"/>
+              <a:rPr lang="en-US" sz="3600" dirty="0"/>
               <a:t>Finding 3</a:t>
             </a:r>
-            <a:endParaRPr lang="en-US" sz="3600" dirty="0"/>
           </a:p>
         </p:txBody>
       </p:sp>
@@ -5513,7 +5504,7 @@
             </a:pPr>
             <a:r>
               <a:rPr lang="en-US" sz="2400" dirty="0"/>
-              <a:t>40 % of the most popular Capital Bikeshare stations are within a 0.5 mile radius from the metro stations.</a:t>
+              <a:t>40 % of the most popular Capital Bikeshare stations are within a 0.5 mile radius from metro stations.</a:t>
             </a:r>
             <a:br>
               <a:rPr lang="en-US" sz="2400" dirty="0"/>
@@ -5565,13 +5556,6 @@
   <p:transition spd="slow">
     <p:wipe/>
   </p:transition>
-  <p:timing>
-    <p:tnLst>
-      <p:par>
-        <p:cTn id="1" dur="indefinite" restart="never" nodeType="tmRoot"/>
-      </p:par>
-    </p:tnLst>
-  </p:timing>
 </p:sld>
 </file>
 
@@ -5804,16 +5788,21 @@
           </a:lstStyle>
           <a:p>
             <a:r>
-              <a:rPr lang="en-US" dirty="0" smtClean="0"/>
+              <a:rPr lang="en-US" dirty="0"/>
               <a:t>Increase number of Bikeshare stations within 0.5 mile radius of a metro station.</a:t>
             </a:r>
           </a:p>
           <a:p>
             <a:r>
-              <a:rPr lang="en-US" dirty="0" smtClean="0"/>
-              <a:t>Introduce Bikeshare stations near metro stations in the DMV area</a:t>
-            </a:r>
-            <a:endParaRPr lang="en-US" dirty="0" smtClean="0"/>
+              <a:rPr lang="en-US" dirty="0"/>
+              <a:t>Increase number of bikes and docks at current stations.</a:t>
+            </a:r>
+          </a:p>
+          <a:p>
+            <a:r>
+              <a:rPr lang="en-US" dirty="0"/>
+              <a:t>Introduce new Bikeshare stations near metro stations in the DMV area that do not currently have a bike station within 0.5 miles. </a:t>
+            </a:r>
           </a:p>
         </p:txBody>
       </p:sp>
@@ -5833,10 +5822,9 @@
           <a:lstStyle/>
           <a:p>
             <a:r>
-              <a:rPr lang="en-US" dirty="0" smtClean="0"/>
+              <a:rPr lang="en-US" dirty="0"/>
               <a:t>Recommendation</a:t>
             </a:r>
-            <a:endParaRPr lang="en-US" dirty="0"/>
           </a:p>
         </p:txBody>
       </p:sp>
@@ -5853,13 +5841,6 @@
   <p:transition spd="slow">
     <p:push dir="u"/>
   </p:transition>
-  <p:timing>
-    <p:tnLst>
-      <p:par>
-        <p:cTn id="1" dur="indefinite" restart="never" nodeType="tmRoot"/>
-      </p:par>
-    </p:tnLst>
-  </p:timing>
 </p:sld>
 </file>
 
@@ -5897,10 +5878,9 @@
           <a:p>
             <a:pPr algn="ctr"/>
             <a:r>
-              <a:rPr lang="en-US" sz="3600" dirty="0" smtClean="0"/>
+              <a:rPr lang="en-US" sz="3600" dirty="0"/>
               <a:t>Finding 4</a:t>
             </a:r>
-            <a:endParaRPr lang="en-US" sz="3600" dirty="0"/>
           </a:p>
         </p:txBody>
       </p:sp>
@@ -5931,9 +5911,8 @@
             </a:pPr>
             <a:r>
               <a:rPr lang="en-US" sz="2400" dirty="0"/>
-              <a:t>Along the routes taken by Capital Bikeshare users between the most common combinations of start and end stations, most have incomplete bike lane coverage.</a:t>
-            </a:r>
-            <a:endParaRPr lang="en-US" sz="2400" dirty="0"/>
+              <a:t>The most common combinations of start and end stations used by Capital Bikeshare riders have incomplete bike lane coverage.</a:t>
+            </a:r>
           </a:p>
         </p:txBody>
       </p:sp>
@@ -5980,13 +5959,6 @@
   <p:transition spd="slow">
     <p:wipe/>
   </p:transition>
-  <p:timing>
-    <p:tnLst>
-      <p:par>
-        <p:cTn id="1" dur="indefinite" restart="never" nodeType="tmRoot"/>
-      </p:par>
-    </p:tnLst>
-  </p:timing>
 </p:sld>
 </file>
 
@@ -6024,10 +5996,9 @@
           <a:p>
             <a:pPr algn="ctr"/>
             <a:r>
-              <a:rPr lang="en-US" sz="3600" dirty="0" smtClean="0"/>
+              <a:rPr lang="en-US" sz="3600" dirty="0"/>
               <a:t>Finding 4</a:t>
             </a:r>
-            <a:endParaRPr lang="en-US" sz="3600" dirty="0"/>
           </a:p>
         </p:txBody>
       </p:sp>
@@ -6057,10 +6028,9 @@
               <a:buNone/>
             </a:pPr>
             <a:r>
-              <a:rPr lang="en-US" sz="2400"/>
-              <a:t>Along the routes taken by Capital Bikeshare users between the most common combinations of start and end stations, most have incomplete bike lane coverage.</a:t>
-            </a:r>
-            <a:endParaRPr lang="en-US" sz="2400" dirty="0"/>
+              <a:rPr lang="en-US" sz="2400" dirty="0"/>
+              <a:t>The most common combinations of start and end stations used by Capital Bikeshare riders have incomplete bike lane coverage.</a:t>
+            </a:r>
           </a:p>
         </p:txBody>
       </p:sp>
@@ -6107,13 +6077,6 @@
   <p:transition spd="slow">
     <p:wipe/>
   </p:transition>
-  <p:timing>
-    <p:tnLst>
-      <p:par>
-        <p:cTn id="1" dur="indefinite" restart="never" nodeType="tmRoot"/>
-      </p:par>
-    </p:tnLst>
-  </p:timing>
 </p:sld>
 </file>
 
@@ -6346,51 +6309,34 @@
           </a:lstStyle>
           <a:p>
             <a:r>
-              <a:rPr lang="en-US" dirty="0" smtClean="0"/>
-              <a:t>Pitch the city to build more bike lanes in order to promote customer </a:t>
-            </a:r>
-            <a:r>
               <a:rPr lang="en-US" dirty="0"/>
-              <a:t>s</a:t>
-            </a:r>
-            <a:r>
-              <a:rPr lang="en-US" dirty="0" smtClean="0"/>
-              <a:t>afety and  increase customer </a:t>
-            </a:r>
+              <a:t>Pitch the city to build more bike lanes in order to promote customer safety and  increase customer satisfaction.</a:t>
+            </a:r>
+          </a:p>
+          <a:p>
+            <a:endParaRPr lang="en-US" dirty="0"/>
+          </a:p>
+        </p:txBody>
+      </p:sp>
+      <p:sp>
+        <p:nvSpPr>
+          <p:cNvPr id="2" name="Title 1"/>
+          <p:cNvSpPr>
+            <a:spLocks noGrp="1"/>
+          </p:cNvSpPr>
+          <p:nvPr>
+            <p:ph type="title"/>
+          </p:nvPr>
+        </p:nvSpPr>
+        <p:spPr/>
+        <p:txBody>
+          <a:bodyPr/>
+          <a:lstStyle/>
+          <a:p>
             <a:r>
               <a:rPr lang="en-US" dirty="0"/>
-              <a:t>s</a:t>
-            </a:r>
-            <a:r>
-              <a:rPr lang="en-US" dirty="0" smtClean="0"/>
-              <a:t>atisfaction.</a:t>
-            </a:r>
-          </a:p>
-          <a:p>
-            <a:endParaRPr lang="en-US" dirty="0"/>
-          </a:p>
-        </p:txBody>
-      </p:sp>
-      <p:sp>
-        <p:nvSpPr>
-          <p:cNvPr id="2" name="Title 1"/>
-          <p:cNvSpPr>
-            <a:spLocks noGrp="1"/>
-          </p:cNvSpPr>
-          <p:nvPr>
-            <p:ph type="title"/>
-          </p:nvPr>
-        </p:nvSpPr>
-        <p:spPr/>
-        <p:txBody>
-          <a:bodyPr/>
-          <a:lstStyle/>
-          <a:p>
-            <a:r>
-              <a:rPr lang="en-US" dirty="0" smtClean="0"/>
               <a:t>Recommendation</a:t>
             </a:r>
-            <a:endParaRPr lang="en-US" dirty="0"/>
           </a:p>
         </p:txBody>
       </p:sp>
@@ -6407,13 +6353,6 @@
   <p:transition spd="slow">
     <p:push dir="u"/>
   </p:transition>
-  <p:timing>
-    <p:tnLst>
-      <p:par>
-        <p:cTn id="1" dur="indefinite" restart="never" nodeType="tmRoot"/>
-      </p:par>
-    </p:tnLst>
-  </p:timing>
 </p:sld>
 </file>
 
@@ -6450,10 +6389,9 @@
           <a:lstStyle/>
           <a:p>
             <a:r>
-              <a:rPr lang="en-US" dirty="0" smtClean="0"/>
+              <a:rPr lang="en-US" dirty="0"/>
               <a:t>Finding 5</a:t>
             </a:r>
-            <a:endParaRPr lang="en-US" dirty="0"/>
           </a:p>
         </p:txBody>
       </p:sp>
@@ -6486,7 +6424,6 @@
               <a:rPr lang="en-US" sz="2400" dirty="0"/>
               <a:t>Bikeshare stations in Washington, D.C. are significantly more popular than stations in the suburbs.</a:t>
             </a:r>
-            <a:endParaRPr lang="en-US" sz="2400" dirty="0"/>
           </a:p>
         </p:txBody>
       </p:sp>
@@ -6527,13 +6464,6 @@
   <p:transition spd="slow">
     <p:wipe/>
   </p:transition>
-  <p:timing>
-    <p:tnLst>
-      <p:par>
-        <p:cTn id="1" dur="indefinite" restart="never" nodeType="tmRoot"/>
-      </p:par>
-    </p:tnLst>
-  </p:timing>
 </p:sld>
 </file>
 
@@ -6766,10 +6696,9 @@
           </a:lstStyle>
           <a:p>
             <a:r>
-              <a:rPr lang="en-US" dirty="0" smtClean="0"/>
+              <a:rPr lang="en-US" dirty="0"/>
               <a:t>Marketing strategies to increase suburban bike usage.</a:t>
             </a:r>
-            <a:endParaRPr lang="en-US" dirty="0"/>
           </a:p>
         </p:txBody>
       </p:sp>
@@ -6789,10 +6718,9 @@
           <a:lstStyle/>
           <a:p>
             <a:r>
-              <a:rPr lang="en-US" dirty="0" smtClean="0"/>
+              <a:rPr lang="en-US" dirty="0"/>
               <a:t>Recommendation</a:t>
             </a:r>
-            <a:endParaRPr lang="en-US" dirty="0"/>
           </a:p>
         </p:txBody>
       </p:sp>
@@ -6809,13 +6737,6 @@
   <p:transition spd="slow">
     <p:push dir="u"/>
   </p:transition>
-  <p:timing>
-    <p:tnLst>
-      <p:par>
-        <p:cTn id="1" dur="indefinite" restart="never" nodeType="tmRoot"/>
-      </p:par>
-    </p:tnLst>
-  </p:timing>
 </p:sld>
 </file>
 
@@ -6852,10 +6773,9 @@
           <a:lstStyle/>
           <a:p>
             <a:r>
-              <a:rPr lang="en-US" dirty="0" smtClean="0"/>
+              <a:rPr lang="en-US" dirty="0"/>
               <a:t>DATA INFORMATION</a:t>
             </a:r>
-            <a:endParaRPr lang="en-US" dirty="0"/>
           </a:p>
         </p:txBody>
       </p:sp>
@@ -6872,13 +6792,6 @@
   <p:transition spd="med">
     <p:pull/>
   </p:transition>
-  <p:timing>
-    <p:tnLst>
-      <p:par>
-        <p:cTn id="1" dur="indefinite" restart="never" nodeType="tmRoot"/>
-      </p:par>
-    </p:tnLst>
-  </p:timing>
 </p:sld>
 </file>
 
@@ -6915,10 +6828,9 @@
           <a:lstStyle/>
           <a:p>
             <a:r>
-              <a:rPr lang="en-US" dirty="0" smtClean="0"/>
+              <a:rPr lang="en-US" dirty="0"/>
               <a:t>SOURCE</a:t>
             </a:r>
-            <a:endParaRPr lang="en-US" dirty="0"/>
           </a:p>
         </p:txBody>
       </p:sp>
@@ -6938,7 +6850,7 @@
           <a:lstStyle/>
           <a:p>
             <a:r>
-              <a:rPr lang="en-US" dirty="0" smtClean="0"/>
+              <a:rPr lang="en-US" dirty="0"/>
               <a:t>Data was downloaded from the Capital Bikeshare’s site. </a:t>
             </a:r>
           </a:p>
@@ -6964,54 +6876,31 @@
               </a:rPr>
               <a:t>/system-data</a:t>
             </a:r>
-            <a:endParaRPr lang="en-US" dirty="0" smtClean="0"/>
-          </a:p>
-          <a:p>
-            <a:r>
-              <a:rPr lang="en-US" dirty="0" smtClean="0"/>
-              <a:t>Capital Bikeshare provided data files from year </a:t>
-            </a:r>
-            <a:r>
-              <a:rPr lang="en-US" dirty="0" smtClean="0"/>
-              <a:t>2010 to 2017.</a:t>
-            </a:r>
-            <a:endParaRPr lang="en-US" dirty="0" smtClean="0"/>
-          </a:p>
-          <a:p>
-            <a:r>
-              <a:rPr lang="en-US" dirty="0" smtClean="0"/>
-              <a:t>The years were stored in </a:t>
-            </a:r>
-            <a:r>
-              <a:rPr lang="en-US" dirty="0" smtClean="0"/>
-              <a:t>based on a year quarter</a:t>
-            </a:r>
-            <a:r>
-              <a:rPr lang="en-US" dirty="0" smtClean="0"/>
-              <a:t>.</a:t>
-            </a:r>
-            <a:endParaRPr lang="en-US" dirty="0" smtClean="0"/>
-          </a:p>
-          <a:p>
-            <a:r>
-              <a:rPr lang="en-US" dirty="0" smtClean="0"/>
+            <a:endParaRPr lang="en-US" dirty="0"/>
+          </a:p>
+          <a:p>
+            <a:r>
+              <a:rPr lang="en-US" dirty="0"/>
+              <a:t>Capital Bikeshare provided data files from year 2010 to 2017.</a:t>
+            </a:r>
+          </a:p>
+          <a:p>
+            <a:r>
+              <a:rPr lang="en-US" dirty="0"/>
+              <a:t>The years were stored in based on a year quarter.</a:t>
+            </a:r>
+          </a:p>
+          <a:p>
+            <a:r>
+              <a:rPr lang="en-US" dirty="0"/>
               <a:t>Each record in the data files represents a single bike ride.</a:t>
             </a:r>
           </a:p>
           <a:p>
             <a:r>
-              <a:rPr lang="en-US" dirty="0" smtClean="0"/>
-              <a:t>The record holds information like ,</a:t>
-            </a:r>
-            <a:r>
               <a:rPr lang="en-US" dirty="0"/>
-              <a:t> </a:t>
-            </a:r>
-            <a:r>
-              <a:rPr lang="en-US" dirty="0" smtClean="0"/>
-              <a:t>trip minutes, start date, end date, start station, end station, bike number, membership type</a:t>
-            </a:r>
-            <a:endParaRPr lang="en-US" dirty="0"/>
+              <a:t>The record holds information like , trip minutes, start date, end date, start station, end station, bike number, membership type</a:t>
+            </a:r>
           </a:p>
         </p:txBody>
       </p:sp>
@@ -7028,13 +6917,6 @@
   <p:transition spd="slow">
     <p:wipe/>
   </p:transition>
-  <p:timing>
-    <p:tnLst>
-      <p:par>
-        <p:cTn id="1" dur="indefinite" restart="never" nodeType="tmRoot"/>
-      </p:par>
-    </p:tnLst>
-  </p:timing>
 </p:sld>
 </file>
 
@@ -7071,10 +6953,9 @@
           <a:lstStyle/>
           <a:p>
             <a:r>
-              <a:rPr lang="en-US" dirty="0" smtClean="0"/>
+              <a:rPr lang="en-US" dirty="0"/>
               <a:t>LIMITATIONS</a:t>
             </a:r>
-            <a:endParaRPr lang="en-US" dirty="0"/>
           </a:p>
         </p:txBody>
       </p:sp>
@@ -7094,35 +6975,21 @@
           <a:lstStyle/>
           <a:p>
             <a:r>
-              <a:rPr lang="en-US" dirty="0" smtClean="0"/>
+              <a:rPr lang="en-US" dirty="0"/>
               <a:t>Over the time period from 2010 to 2017 the number of attributes in data file changes several times.</a:t>
             </a:r>
           </a:p>
           <a:p>
             <a:r>
-              <a:rPr lang="en-US" dirty="0" smtClean="0"/>
-              <a:t>Inconsistent namin</a:t>
-            </a:r>
-            <a:r>
-              <a:rPr lang="en-US" dirty="0" smtClean="0"/>
-              <a:t>g conventions for fields and variables</a:t>
-            </a:r>
-            <a:r>
-              <a:rPr lang="en-US" dirty="0" smtClean="0"/>
-              <a:t>.</a:t>
-            </a:r>
-            <a:endParaRPr lang="en-US" dirty="0" smtClean="0"/>
-          </a:p>
-          <a:p>
-            <a:r>
-              <a:rPr lang="en-US" dirty="0" smtClean="0"/>
-              <a:t>Maximum time spent in combining the data files together</a:t>
-            </a:r>
-            <a:r>
-              <a:rPr lang="en-US" dirty="0" smtClean="0"/>
-              <a:t>.</a:t>
-            </a:r>
-            <a:endParaRPr lang="en-US" dirty="0" smtClean="0"/>
+              <a:rPr lang="en-US" dirty="0"/>
+              <a:t>Inconsistent naming conventions for fields and variables.</a:t>
+            </a:r>
+          </a:p>
+          <a:p>
+            <a:r>
+              <a:rPr lang="en-US" dirty="0"/>
+              <a:t>Maximum time spent in combining the data files together.</a:t>
+            </a:r>
           </a:p>
           <a:p>
             <a:endParaRPr lang="en-US" dirty="0"/>
@@ -7142,13 +7009,6 @@
   <p:transition spd="slow">
     <p:wipe/>
   </p:transition>
-  <p:timing>
-    <p:tnLst>
-      <p:par>
-        <p:cTn id="1" dur="indefinite" restart="never" nodeType="tmRoot"/>
-      </p:par>
-    </p:tnLst>
-  </p:timing>
 </p:sld>
 </file>
 
@@ -7185,10 +7045,9 @@
           <a:lstStyle/>
           <a:p>
             <a:r>
-              <a:rPr lang="en-US" dirty="0" smtClean="0"/>
+              <a:rPr lang="en-US" dirty="0"/>
               <a:t>AGENDA</a:t>
             </a:r>
-            <a:endParaRPr lang="en-US" dirty="0"/>
           </a:p>
         </p:txBody>
       </p:sp>
@@ -7210,28 +7069,21 @@
           <a:lstStyle/>
           <a:p>
             <a:r>
-              <a:rPr lang="en-US" sz="2000" dirty="0" smtClean="0"/>
+              <a:rPr lang="en-US" sz="2000" dirty="0"/>
               <a:t>INTRODUCTION &amp; GOALS</a:t>
             </a:r>
-            <a:endParaRPr lang="en-US" sz="2000" dirty="0" smtClean="0"/>
-          </a:p>
-          <a:p>
-            <a:r>
-              <a:rPr lang="en-US" sz="2000" dirty="0" smtClean="0"/>
+          </a:p>
+          <a:p>
+            <a:r>
+              <a:rPr lang="en-US" sz="2000" dirty="0"/>
               <a:t>FINDINGS</a:t>
             </a:r>
-            <a:endParaRPr lang="en-US" sz="2000" dirty="0" smtClean="0"/>
-          </a:p>
-          <a:p>
-            <a:r>
-              <a:rPr lang="en-US" sz="2000" dirty="0" smtClean="0"/>
-              <a:t>DATA </a:t>
-            </a:r>
-            <a:r>
-              <a:rPr lang="en-US" sz="2000" dirty="0" smtClean="0"/>
-              <a:t>INFORMATION</a:t>
-            </a:r>
-            <a:endParaRPr lang="en-US" sz="2000" dirty="0" smtClean="0"/>
+          </a:p>
+          <a:p>
+            <a:r>
+              <a:rPr lang="en-US" sz="2000" dirty="0"/>
+              <a:t>DATA INFORMATION</a:t>
+            </a:r>
           </a:p>
         </p:txBody>
       </p:sp>
@@ -7248,13 +7100,6 @@
   <p:transition spd="slow">
     <p:wipe/>
   </p:transition>
-  <p:timing>
-    <p:tnLst>
-      <p:par>
-        <p:cTn id="1" dur="indefinite" restart="never" nodeType="tmRoot"/>
-      </p:par>
-    </p:tnLst>
-  </p:timing>
 </p:sld>
 </file>
 
@@ -7292,10 +7137,9 @@
           <a:p>
             <a:pPr algn="ctr"/>
             <a:r>
-              <a:rPr lang="en-US" dirty="0" smtClean="0"/>
+              <a:rPr lang="en-US" dirty="0"/>
               <a:t>THANK YOU!</a:t>
             </a:r>
-            <a:endParaRPr lang="en-US" dirty="0"/>
           </a:p>
         </p:txBody>
       </p:sp>
@@ -7321,13 +7165,6 @@
       </p:transition>
     </mc:Fallback>
   </mc:AlternateContent>
-  <p:timing>
-    <p:tnLst>
-      <p:par>
-        <p:cTn id="1" dur="indefinite" restart="never" nodeType="tmRoot"/>
-      </p:par>
-    </p:tnLst>
-  </p:timing>
 </p:sld>
 </file>
 
@@ -7365,10 +7202,9 @@
           <a:p>
             <a:pPr algn="ctr"/>
             <a:r>
-              <a:rPr lang="en-US" dirty="0" smtClean="0"/>
+              <a:rPr lang="en-US" dirty="0"/>
               <a:t>QUESTIONS?</a:t>
             </a:r>
-            <a:endParaRPr lang="en-US" dirty="0"/>
           </a:p>
         </p:txBody>
       </p:sp>
@@ -7388,10 +7224,9 @@
           <a:lstStyle/>
           <a:p>
             <a:r>
-              <a:rPr lang="en-US" dirty="0" smtClean="0"/>
+              <a:rPr lang="en-US" dirty="0"/>
               <a:t>-Ask us anything.</a:t>
             </a:r>
-            <a:endParaRPr lang="en-US" dirty="0"/>
           </a:p>
         </p:txBody>
       </p:sp>
@@ -7417,13 +7252,6 @@
       </p:transition>
     </mc:Fallback>
   </mc:AlternateContent>
-  <p:timing>
-    <p:tnLst>
-      <p:par>
-        <p:cTn id="1" dur="indefinite" restart="never" nodeType="tmRoot"/>
-      </p:par>
-    </p:tnLst>
-  </p:timing>
 </p:sld>
 </file>
 
@@ -7460,10 +7288,9 @@
           <a:lstStyle/>
           <a:p>
             <a:r>
-              <a:rPr lang="en-US" dirty="0" smtClean="0"/>
+              <a:rPr lang="en-US" dirty="0"/>
               <a:t>INTRODUCTION</a:t>
             </a:r>
-            <a:endParaRPr lang="en-US" dirty="0"/>
           </a:p>
         </p:txBody>
       </p:sp>
@@ -7483,24 +7310,15 @@
           <a:lstStyle/>
           <a:p>
             <a:r>
-              <a:rPr lang="en-US" dirty="0" smtClean="0"/>
-              <a:t>TEAM MEMBERS - </a:t>
-            </a:r>
-            <a:r>
               <a:rPr lang="en-US" dirty="0"/>
-              <a:t>Alisha Gonsalves, Gina Visnansky, Roberto Rubio and Sean Mussenden</a:t>
-            </a:r>
-          </a:p>
-          <a:p>
-            <a:r>
-              <a:rPr lang="en-US" dirty="0" smtClean="0"/>
-              <a:t>Consulting group hired by Capital </a:t>
-            </a:r>
-            <a:r>
-              <a:rPr lang="en-US" dirty="0" smtClean="0"/>
-              <a:t>Bikeshare executives.</a:t>
-            </a:r>
-            <a:endParaRPr lang="en-US" dirty="0" smtClean="0"/>
+              <a:t>TEAM MEMBERS - Alisha Gonsalves, Gina Visnansky, Roberto Rubio and Sean Mussenden</a:t>
+            </a:r>
+          </a:p>
+          <a:p>
+            <a:r>
+              <a:rPr lang="en-US" dirty="0"/>
+              <a:t>Consulting group hired by Capital Bikeshare executives.</a:t>
+            </a:r>
           </a:p>
         </p:txBody>
       </p:sp>
@@ -7517,13 +7335,6 @@
   <p:transition spd="slow">
     <p:wipe/>
   </p:transition>
-  <p:timing>
-    <p:tnLst>
-      <p:par>
-        <p:cTn id="1" dur="indefinite" restart="never" nodeType="tmRoot"/>
-      </p:par>
-    </p:tnLst>
-  </p:timing>
 </p:sld>
 </file>
 
@@ -7560,10 +7371,9 @@
           <a:lstStyle/>
           <a:p>
             <a:r>
-              <a:rPr lang="en-US" dirty="0" smtClean="0"/>
+              <a:rPr lang="en-US" dirty="0"/>
               <a:t>OUR TASK</a:t>
             </a:r>
-            <a:endParaRPr lang="en-US" dirty="0"/>
           </a:p>
         </p:txBody>
       </p:sp>
@@ -7583,59 +7393,36 @@
           <a:lstStyle/>
           <a:p>
             <a:r>
-              <a:rPr lang="en-US" dirty="0" smtClean="0"/>
-              <a:t>To </a:t>
-            </a:r>
-            <a:r>
-              <a:rPr lang="en-US" dirty="0" smtClean="0"/>
-              <a:t>analyze </a:t>
-            </a:r>
-            <a:r>
-              <a:rPr lang="en-US" dirty="0" smtClean="0"/>
-              <a:t>Capital Bikeshare data</a:t>
-            </a:r>
-          </a:p>
-          <a:p>
-            <a:r>
-              <a:rPr lang="en-US" dirty="0" smtClean="0"/>
-              <a:t>To make recommendations </a:t>
-            </a:r>
-            <a:r>
-              <a:rPr lang="en-US" dirty="0" smtClean="0"/>
-              <a:t>to improve:</a:t>
+              <a:rPr lang="en-US" dirty="0"/>
+              <a:t>To analyze Capital Bikeshare data</a:t>
+            </a:r>
+          </a:p>
+          <a:p>
+            <a:r>
+              <a:rPr lang="en-US" dirty="0"/>
+              <a:t>To make recommendations to improve:</a:t>
             </a:r>
           </a:p>
           <a:p>
             <a:pPr lvl="1"/>
             <a:r>
-              <a:rPr lang="en-US" dirty="0" smtClean="0"/>
-              <a:t>Business</a:t>
-            </a:r>
-            <a:r>
               <a:rPr lang="en-US" dirty="0"/>
-              <a:t> </a:t>
-            </a:r>
-            <a:r>
-              <a:rPr lang="en-US" dirty="0" smtClean="0"/>
-              <a:t>operations</a:t>
-            </a:r>
-            <a:endParaRPr lang="en-US" dirty="0" smtClean="0"/>
+              <a:t>Business operations</a:t>
+            </a:r>
           </a:p>
           <a:p>
             <a:pPr lvl="1"/>
             <a:r>
-              <a:rPr lang="en-US" dirty="0" smtClean="0"/>
+              <a:rPr lang="en-US" dirty="0"/>
               <a:t>Revenue </a:t>
             </a:r>
-            <a:endParaRPr lang="en-US" dirty="0" smtClean="0"/>
           </a:p>
           <a:p>
             <a:pPr lvl="1"/>
             <a:r>
-              <a:rPr lang="en-US" dirty="0" smtClean="0"/>
+              <a:rPr lang="en-US" dirty="0"/>
               <a:t>Customer Satisfaction</a:t>
             </a:r>
-            <a:endParaRPr lang="en-US" dirty="0"/>
           </a:p>
         </p:txBody>
       </p:sp>
@@ -7652,13 +7439,6 @@
   <p:transition spd="slow">
     <p:wipe/>
   </p:transition>
-  <p:timing>
-    <p:tnLst>
-      <p:par>
-        <p:cTn id="1" dur="indefinite" restart="never" nodeType="tmRoot"/>
-      </p:par>
-    </p:tnLst>
-  </p:timing>
 </p:sld>
 </file>
 
@@ -7701,10 +7481,9 @@
           <a:p>
             <a:pPr algn="ctr"/>
             <a:r>
-              <a:rPr lang="en-US" sz="6600" dirty="0" smtClean="0"/>
+              <a:rPr lang="en-US" sz="6600" dirty="0"/>
               <a:t>FINDINGS</a:t>
             </a:r>
-            <a:endParaRPr lang="en-US" sz="6600" dirty="0"/>
           </a:p>
         </p:txBody>
       </p:sp>
@@ -7721,13 +7500,6 @@
   <p:transition spd="slow">
     <p:cover/>
   </p:transition>
-  <p:timing>
-    <p:tnLst>
-      <p:par>
-        <p:cTn id="1" dur="indefinite" restart="never" nodeType="tmRoot"/>
-      </p:par>
-    </p:tnLst>
-  </p:timing>
 </p:sld>
 </file>
 
@@ -7765,10 +7537,9 @@
           <a:p>
             <a:pPr algn="ctr"/>
             <a:r>
-              <a:rPr lang="en-US" sz="3600" dirty="0" smtClean="0"/>
+              <a:rPr lang="en-US" sz="3600" dirty="0"/>
               <a:t>Finding 1</a:t>
             </a:r>
-            <a:endParaRPr lang="en-US" sz="3600" dirty="0"/>
           </a:p>
         </p:txBody>
       </p:sp>
@@ -7798,10 +7569,9 @@
               <a:buNone/>
             </a:pPr>
             <a:r>
-              <a:rPr lang="en-US" sz="2400" dirty="0" smtClean="0"/>
+              <a:rPr lang="en-US" sz="2400" dirty="0"/>
               <a:t>There is room to improve ridership in Fall and Spring.</a:t>
             </a:r>
-            <a:endParaRPr lang="en-US" sz="2400" dirty="0"/>
           </a:p>
         </p:txBody>
       </p:sp>
@@ -7848,13 +7618,6 @@
   <p:transition spd="slow">
     <p:wipe/>
   </p:transition>
-  <p:timing>
-    <p:tnLst>
-      <p:par>
-        <p:cTn id="1" dur="indefinite" restart="never" nodeType="tmRoot"/>
-      </p:par>
-    </p:tnLst>
-  </p:timing>
 </p:sld>
 </file>
 
@@ -8090,28 +7853,28 @@
           <a:p>
             <a:pPr lvl="1"/>
             <a:r>
-              <a:rPr lang="en-US" dirty="0" smtClean="0"/>
+              <a:rPr lang="en-US" dirty="0"/>
               <a:t>Ad campaigns displaying benefits of riding during Fall and Spring</a:t>
             </a:r>
           </a:p>
           <a:p>
             <a:pPr lvl="1"/>
             <a:r>
-              <a:rPr lang="en-US" dirty="0" smtClean="0"/>
+              <a:rPr lang="en-US" dirty="0"/>
               <a:t>Affiliate discount, partner up with local restaurants to provide discounts.</a:t>
             </a:r>
           </a:p>
           <a:p>
             <a:pPr lvl="1"/>
             <a:r>
-              <a:rPr lang="en-US" dirty="0" smtClean="0"/>
+              <a:rPr lang="en-US" dirty="0"/>
               <a:t>Reduce membership fees during Fall and Spring seasons</a:t>
             </a:r>
           </a:p>
           <a:p>
             <a:pPr lvl="1"/>
             <a:r>
-              <a:rPr lang="en-US" dirty="0" smtClean="0"/>
+              <a:rPr lang="en-US" dirty="0"/>
               <a:t>Stronger pitch to commuters to become registered members</a:t>
             </a:r>
           </a:p>
@@ -8133,10 +7896,9 @@
           <a:lstStyle/>
           <a:p>
             <a:r>
-              <a:rPr lang="en-US" dirty="0" smtClean="0"/>
+              <a:rPr lang="en-US" dirty="0"/>
               <a:t>Recommendation</a:t>
             </a:r>
-            <a:endParaRPr lang="en-US" dirty="0"/>
           </a:p>
         </p:txBody>
       </p:sp>
@@ -8153,13 +7915,6 @@
   <p:transition spd="slow">
     <p:push dir="u"/>
   </p:transition>
-  <p:timing>
-    <p:tnLst>
-      <p:par>
-        <p:cTn id="1" dur="indefinite" restart="never" nodeType="tmRoot"/>
-      </p:par>
-    </p:tnLst>
-  </p:timing>
 </p:sld>
 </file>
 
@@ -8197,10 +7952,9 @@
           <a:p>
             <a:pPr algn="ctr"/>
             <a:r>
-              <a:rPr lang="en-US" sz="3600" dirty="0" smtClean="0"/>
+              <a:rPr lang="en-US" sz="3600" dirty="0"/>
               <a:t>Finding 2</a:t>
             </a:r>
-            <a:endParaRPr lang="en-US" sz="3600" dirty="0"/>
           </a:p>
         </p:txBody>
       </p:sp>
@@ -8231,7 +7985,7 @@
             </a:pPr>
             <a:r>
               <a:rPr lang="en-US" sz="2400" dirty="0"/>
-              <a:t>Casual users take more longer trips than Registered users. This takes bikes out of circulation for loyal customers.</a:t>
+              <a:t>Casual users take longer trips than Registered users. This takes bikes out of circulation for loyal customers.</a:t>
             </a:r>
           </a:p>
         </p:txBody>
@@ -8279,13 +8033,6 @@
   <p:transition spd="slow">
     <p:wipe/>
   </p:transition>
-  <p:timing>
-    <p:tnLst>
-      <p:par>
-        <p:cTn id="1" dur="indefinite" restart="never" nodeType="tmRoot"/>
-      </p:par>
-    </p:tnLst>
-  </p:timing>
 </p:sld>
 </file>
 
@@ -8520,16 +8267,15 @@
           </a:lstStyle>
           <a:p>
             <a:r>
-              <a:rPr lang="en-US" dirty="0" smtClean="0"/>
+              <a:rPr lang="en-US" dirty="0"/>
               <a:t>Create special colored bikes for longer trips with lower penalty prices.</a:t>
             </a:r>
           </a:p>
           <a:p>
             <a:r>
-              <a:rPr lang="en-US" dirty="0" smtClean="0"/>
+              <a:rPr lang="en-US" dirty="0"/>
               <a:t>Special membership for Tourists (7-day pass) with higher upfront costs but lower penalty costs.</a:t>
             </a:r>
-            <a:endParaRPr lang="en-US" dirty="0"/>
           </a:p>
         </p:txBody>
       </p:sp>
@@ -8549,10 +8295,9 @@
           <a:lstStyle/>
           <a:p>
             <a:r>
-              <a:rPr lang="en-US" dirty="0" smtClean="0"/>
+              <a:rPr lang="en-US" dirty="0"/>
               <a:t>Recommendation</a:t>
             </a:r>
-            <a:endParaRPr lang="en-US" dirty="0"/>
           </a:p>
         </p:txBody>
       </p:sp>
@@ -8569,13 +8314,6 @@
   <p:transition spd="slow">
     <p:push dir="u"/>
   </p:transition>
-  <p:timing>
-    <p:tnLst>
-      <p:par>
-        <p:cTn id="1" dur="indefinite" restart="never" nodeType="tmRoot"/>
-      </p:par>
-    </p:tnLst>
-  </p:timing>
 </p:sld>
 </file>
 

</xml_diff>